<commit_message>
FEAT: add code-intro slides
</commit_message>
<xml_diff>
--- a/项目介绍.pptx
+++ b/项目介绍.pptx
@@ -18,8 +18,10 @@
     <p:sldId id="260" r:id="rId12"/>
     <p:sldId id="269" r:id="rId13"/>
     <p:sldId id="270" r:id="rId14"/>
-    <p:sldId id="271" r:id="rId15"/>
-    <p:sldId id="272" r:id="rId16"/>
+    <p:sldId id="273" r:id="rId15"/>
+    <p:sldId id="271" r:id="rId16"/>
+    <p:sldId id="272" r:id="rId17"/>
+    <p:sldId id="274" r:id="rId18"/>
   </p:sldIdLst>
   <p:sldSz cx="9144000" cy="6858000" type="screen4x3"/>
   <p:notesSz cx="6858000" cy="9144000"/>
@@ -562,7 +564,7 @@
             </a:ln>
             <a:extLst>
               <a:ext uri="{91240B29-F687-4f45-9708-019B960494DF}">
-                <a14:hiddenLine xmlns="" xmlns:a14="http://schemas.microsoft.com/office/drawing/2010/main" w="9525">
+                <a14:hiddenLine xmlns:a14="http://schemas.microsoft.com/office/drawing/2010/main" xmlns="" w="9525">
                   <a:solidFill>
                     <a:srgbClr val="000000"/>
                   </a:solidFill>
@@ -1643,7 +1645,7 @@
             </a:ln>
             <a:extLst>
               <a:ext uri="{91240B29-F687-4f45-9708-019B960494DF}">
-                <a14:hiddenLine xmlns="" xmlns:a14="http://schemas.microsoft.com/office/drawing/2010/main" w="9525">
+                <a14:hiddenLine xmlns:a14="http://schemas.microsoft.com/office/drawing/2010/main" xmlns="" w="9525">
                   <a:solidFill>
                     <a:srgbClr val="000000"/>
                   </a:solidFill>
@@ -2729,7 +2731,7 @@
             </a:ln>
             <a:extLst>
               <a:ext uri="{91240B29-F687-4f45-9708-019B960494DF}">
-                <a14:hiddenLine xmlns="" xmlns:a14="http://schemas.microsoft.com/office/drawing/2010/main" w="9525">
+                <a14:hiddenLine xmlns:a14="http://schemas.microsoft.com/office/drawing/2010/main" xmlns="" w="9525">
                   <a:solidFill>
                     <a:srgbClr val="000000"/>
                   </a:solidFill>
@@ -3690,7 +3692,7 @@
             </a:ln>
             <a:extLst>
               <a:ext uri="{91240B29-F687-4f45-9708-019B960494DF}">
-                <a14:hiddenLine xmlns="" xmlns:a14="http://schemas.microsoft.com/office/drawing/2010/main" w="9525">
+                <a14:hiddenLine xmlns:a14="http://schemas.microsoft.com/office/drawing/2010/main" xmlns="" w="9525">
                   <a:solidFill>
                     <a:srgbClr val="000000"/>
                   </a:solidFill>
@@ -4805,7 +4807,7 @@
             </a:ln>
             <a:extLst>
               <a:ext uri="{91240B29-F687-4f45-9708-019B960494DF}">
-                <a14:hiddenLine xmlns="" xmlns:a14="http://schemas.microsoft.com/office/drawing/2010/main" w="9525">
+                <a14:hiddenLine xmlns:a14="http://schemas.microsoft.com/office/drawing/2010/main" xmlns="" w="9525">
                   <a:solidFill>
                     <a:srgbClr val="000000"/>
                   </a:solidFill>
@@ -7554,7 +7556,7 @@
           </a:ln>
           <a:extLst>
             <a:ext uri="{91240B29-F687-4f45-9708-019B960494DF}">
-              <a14:hiddenLine xmlns="" xmlns:a14="http://schemas.microsoft.com/office/drawing/2010/main" w="9525">
+              <a14:hiddenLine xmlns:a14="http://schemas.microsoft.com/office/drawing/2010/main" xmlns="" w="9525">
                 <a:solidFill>
                   <a:srgbClr val="000000"/>
                 </a:solidFill>
@@ -8729,7 +8731,7 @@
             </a:ln>
             <a:extLst>
               <a:ext uri="{91240B29-F687-4f45-9708-019B960494DF}">
-                <a14:hiddenLine xmlns="" xmlns:a14="http://schemas.microsoft.com/office/drawing/2010/main" w="9525">
+                <a14:hiddenLine xmlns:a14="http://schemas.microsoft.com/office/drawing/2010/main" xmlns="" w="9525">
                   <a:solidFill>
                     <a:srgbClr val="000000"/>
                   </a:solidFill>
@@ -10697,7 +10699,7 @@
             </a:ln>
             <a:extLst>
               <a:ext uri="{91240B29-F687-4f45-9708-019B960494DF}">
-                <a14:hiddenLine xmlns="" xmlns:a14="http://schemas.microsoft.com/office/drawing/2010/main" w="9525">
+                <a14:hiddenLine xmlns:a14="http://schemas.microsoft.com/office/drawing/2010/main" xmlns="" w="9525">
                   <a:solidFill>
                     <a:srgbClr val="000000"/>
                   </a:solidFill>
@@ -11755,7 +11757,7 @@
             </a:ln>
             <a:extLst>
               <a:ext uri="{91240B29-F687-4f45-9708-019B960494DF}">
-                <a14:hiddenLine xmlns="" xmlns:a14="http://schemas.microsoft.com/office/drawing/2010/main" w="9525">
+                <a14:hiddenLine xmlns:a14="http://schemas.microsoft.com/office/drawing/2010/main" xmlns="" w="9525">
                   <a:solidFill>
                     <a:srgbClr val="000000"/>
                   </a:solidFill>
@@ -12805,7 +12807,7 @@
             </a:ln>
             <a:extLst>
               <a:ext uri="{91240B29-F687-4f45-9708-019B960494DF}">
-                <a14:hiddenLine xmlns="" xmlns:a14="http://schemas.microsoft.com/office/drawing/2010/main" w="9525">
+                <a14:hiddenLine xmlns:a14="http://schemas.microsoft.com/office/drawing/2010/main" xmlns="" w="9525">
                   <a:solidFill>
                     <a:srgbClr val="000000"/>
                   </a:solidFill>
@@ -13783,7 +13785,7 @@
           <a:p>
             <a:r>
               <a:rPr lang="zh-CN" altLang="en-US" dirty="0"/>
-              <a:t>编程语言</a:t>
+              <a:t>服务端概览</a:t>
             </a:r>
           </a:p>
         </p:txBody>
@@ -13819,15 +13821,16 @@
             </a:r>
             <a:r>
               <a:rPr lang="en-US" altLang="zh-CN" dirty="0"/>
-              <a:t>GO</a:t>
+              <a:t>Go</a:t>
             </a:r>
             <a:r>
               <a:rPr lang="zh-CN" altLang="en-US" dirty="0"/>
-              <a:t>语言编写</a:t>
+              <a:t>语言开发</a:t>
             </a:r>
             <a:endParaRPr lang="en-US" altLang="zh-CN" dirty="0"/>
           </a:p>
           <a:p>
+            <a:pPr lvl="1"/>
             <a:r>
               <a:rPr lang="en-US" altLang="zh-CN" dirty="0"/>
               <a:t>Go</a:t>
@@ -13842,8 +13845,36 @@
             </a:r>
             <a:r>
               <a:rPr lang="zh-CN" altLang="en-US" dirty="0"/>
-              <a:t>开发的一种静态类型、编译型的编程语言。是一种简单、高效、可靠的编程语言，非常适合开发网络服务和分布式系统。</a:t>
-            </a:r>
+              <a:t>开发的一种静态类型、编译型的编程语言。是一种简单、高效、可靠的编程语言，非常适合开发网络服务和分布式系统</a:t>
+            </a:r>
+            <a:endParaRPr lang="en-US" altLang="zh-CN" dirty="0"/>
+          </a:p>
+          <a:p>
+            <a:r>
+              <a:rPr lang="zh-CN" altLang="en-US" dirty="0"/>
+              <a:t>服务端通过</a:t>
+            </a:r>
+            <a:r>
+              <a:rPr lang="en-US" altLang="zh-CN" dirty="0"/>
+              <a:t>HTTP</a:t>
+            </a:r>
+            <a:r>
+              <a:rPr lang="zh-CN" altLang="en-US" dirty="0"/>
+              <a:t>协议与客户端通信</a:t>
+            </a:r>
+            <a:endParaRPr lang="en-US" altLang="zh-CN" dirty="0"/>
+          </a:p>
+          <a:p>
+            <a:pPr lvl="1"/>
+            <a:r>
+              <a:rPr lang="en-US" altLang="zh-CN" dirty="0"/>
+              <a:t>Client-Server</a:t>
+            </a:r>
+            <a:r>
+              <a:rPr lang="zh-CN" altLang="en-US" dirty="0"/>
+              <a:t>服务模式</a:t>
+            </a:r>
+            <a:endParaRPr lang="en-US" altLang="zh-CN" dirty="0"/>
           </a:p>
         </p:txBody>
       </p:sp>
@@ -13947,36 +13978,58 @@
           <a:p>
             <a:r>
               <a:rPr lang="zh-CN" altLang="en-US" dirty="0"/>
-              <a:t>技术框架</a:t>
+              <a:t>技术架构</a:t>
             </a:r>
           </a:p>
         </p:txBody>
       </p:sp>
-      <p:sp>
-        <p:nvSpPr>
-          <p:cNvPr id="3" name="内容占位符 2">
+      <p:pic>
+        <p:nvPicPr>
+          <p:cNvPr id="1026" name="Picture 2" descr="image">
             <a:extLst>
               <a:ext uri="{FF2B5EF4-FFF2-40B4-BE49-F238E27FC236}">
-                <a16:creationId xmlns:a16="http://schemas.microsoft.com/office/drawing/2014/main" id="{DB168A2E-736E-FAE6-FCE8-7B49CD53DC94}"/>
+                <a16:creationId xmlns:a16="http://schemas.microsoft.com/office/drawing/2014/main" id="{52770BFB-526B-1B6F-3E15-993F0B044B5E}"/>
               </a:ext>
             </a:extLst>
           </p:cNvPr>
-          <p:cNvSpPr>
-            <a:spLocks noGrp="1"/>
-          </p:cNvSpPr>
-          <p:nvPr>
-            <p:ph idx="1"/>
-          </p:nvPr>
-        </p:nvSpPr>
-        <p:spPr/>
-        <p:txBody>
-          <a:bodyPr/>
-          <a:lstStyle/>
-          <a:p>
-            <a:endParaRPr lang="zh-CN" altLang="en-US" dirty="0"/>
-          </a:p>
-        </p:txBody>
-      </p:sp>
+          <p:cNvPicPr>
+            <a:picLocks noChangeAspect="1" noChangeArrowheads="1"/>
+          </p:cNvPicPr>
+          <p:nvPr/>
+        </p:nvPicPr>
+        <p:blipFill>
+          <a:blip r:embed="rId2">
+            <a:extLst>
+              <a:ext uri="{28A0092B-C50C-407E-A947-70E740481C1C}">
+                <a14:useLocalDpi xmlns:a14="http://schemas.microsoft.com/office/drawing/2010/main" val="0"/>
+              </a:ext>
+            </a:extLst>
+          </a:blip>
+          <a:srcRect/>
+          <a:stretch>
+            <a:fillRect/>
+          </a:stretch>
+        </p:blipFill>
+        <p:spPr bwMode="auto">
+          <a:xfrm>
+            <a:off x="865970" y="2625081"/>
+            <a:ext cx="7601410" cy="3305821"/>
+          </a:xfrm>
+          <a:prstGeom prst="rect">
+            <a:avLst/>
+          </a:prstGeom>
+          <a:noFill/>
+          <a:extLst>
+            <a:ext uri="{909E8E84-426E-40DD-AFC4-6F175D3DCCD1}">
+              <a14:hiddenFill xmlns:a14="http://schemas.microsoft.com/office/drawing/2010/main">
+                <a:solidFill>
+                  <a:srgbClr val="FFFFFF"/>
+                </a:solidFill>
+              </a14:hiddenFill>
+            </a:ext>
+          </a:extLst>
+        </p:spPr>
+      </p:pic>
     </p:spTree>
     <p:extLst>
       <p:ext uri="{BB962C8B-B14F-4D97-AF65-F5344CB8AC3E}">
@@ -14030,15 +14083,7 @@
           <a:p>
             <a:r>
               <a:rPr lang="zh-CN" altLang="en-US" dirty="0"/>
-              <a:t>功能拆解</a:t>
-            </a:r>
-            <a:r>
-              <a:rPr lang="en-US" altLang="zh-CN" dirty="0"/>
-              <a:t>——</a:t>
-            </a:r>
-            <a:r>
-              <a:rPr lang="zh-CN" altLang="en-US" dirty="0"/>
-              <a:t>推送流</a:t>
+              <a:t>数据持久化</a:t>
             </a:r>
           </a:p>
         </p:txBody>
@@ -14059,18 +14104,99 @@
             <p:ph idx="1"/>
           </p:nvPr>
         </p:nvSpPr>
-        <p:spPr/>
+        <p:spPr>
+          <a:xfrm>
+            <a:off x="864382" y="2489199"/>
+            <a:ext cx="7338711" cy="1260783"/>
+          </a:xfrm>
+        </p:spPr>
         <p:txBody>
           <a:bodyPr/>
           <a:lstStyle/>
           <a:p>
-            <a:pPr marL="0" indent="0">
-              <a:buNone/>
-            </a:pPr>
-            <a:endParaRPr lang="zh-CN" altLang="en-US" dirty="0"/>
+            <a:r>
+              <a:rPr lang="zh-CN" altLang="en-US" dirty="0"/>
+              <a:t>使用</a:t>
+            </a:r>
+            <a:r>
+              <a:rPr lang="en-US" altLang="zh-CN" dirty="0"/>
+              <a:t>MySQL</a:t>
+            </a:r>
+            <a:r>
+              <a:rPr lang="zh-CN" altLang="en-US" dirty="0"/>
+              <a:t>数据库存储相关数据</a:t>
+            </a:r>
+            <a:endParaRPr lang="en-US" altLang="zh-CN" dirty="0"/>
+          </a:p>
+          <a:p>
+            <a:r>
+              <a:rPr lang="zh-CN" altLang="en-US" dirty="0"/>
+              <a:t>四张表：</a:t>
+            </a:r>
+            <a:r>
+              <a:rPr lang="en-US" altLang="zh-CN" dirty="0"/>
+              <a:t>user</a:t>
+            </a:r>
+            <a:r>
+              <a:rPr lang="zh-CN" altLang="en-US" dirty="0"/>
+              <a:t>、</a:t>
+            </a:r>
+            <a:r>
+              <a:rPr lang="en-US" altLang="zh-CN" dirty="0"/>
+              <a:t>video</a:t>
+            </a:r>
+            <a:r>
+              <a:rPr lang="zh-CN" altLang="en-US" dirty="0"/>
+              <a:t>、</a:t>
+            </a:r>
+            <a:r>
+              <a:rPr lang="en-US" altLang="zh-CN" dirty="0"/>
+              <a:t>comment</a:t>
+            </a:r>
+            <a:r>
+              <a:rPr lang="zh-CN" altLang="en-US" dirty="0"/>
+              <a:t>、</a:t>
+            </a:r>
+            <a:r>
+              <a:rPr lang="en-US" altLang="zh-CN" dirty="0"/>
+              <a:t>favorite</a:t>
+            </a:r>
+          </a:p>
+          <a:p>
+            <a:endParaRPr lang="en-US" altLang="zh-CN" dirty="0"/>
           </a:p>
         </p:txBody>
       </p:sp>
+      <p:pic>
+        <p:nvPicPr>
+          <p:cNvPr id="4" name="图片 3">
+            <a:extLst>
+              <a:ext uri="{FF2B5EF4-FFF2-40B4-BE49-F238E27FC236}">
+                <a16:creationId xmlns:a16="http://schemas.microsoft.com/office/drawing/2014/main" id="{0207E7EC-87B4-5A95-4D43-00E30CBB1B54}"/>
+              </a:ext>
+            </a:extLst>
+          </p:cNvPr>
+          <p:cNvPicPr>
+            <a:picLocks noChangeAspect="1"/>
+          </p:cNvPicPr>
+          <p:nvPr/>
+        </p:nvPicPr>
+        <p:blipFill>
+          <a:blip r:embed="rId2"/>
+          <a:stretch>
+            <a:fillRect/>
+          </a:stretch>
+        </p:blipFill>
+        <p:spPr>
+          <a:xfrm>
+            <a:off x="940906" y="3749983"/>
+            <a:ext cx="7262187" cy="2511455"/>
+          </a:xfrm>
+          <a:prstGeom prst="rect">
+            <a:avLst/>
+          </a:prstGeom>
+        </p:spPr>
+      </p:pic>
     </p:spTree>
     <p:extLst>
       <p:ext uri="{BB962C8B-B14F-4D97-AF65-F5344CB8AC3E}">
@@ -14101,12 +14227,42 @@
           <a:chExt cx="0" cy="0"/>
         </a:xfrm>
       </p:grpSpPr>
+      <p:pic>
+        <p:nvPicPr>
+          <p:cNvPr id="7" name="图片 6">
+            <a:extLst>
+              <a:ext uri="{FF2B5EF4-FFF2-40B4-BE49-F238E27FC236}">
+                <a16:creationId xmlns:a16="http://schemas.microsoft.com/office/drawing/2014/main" id="{1D0AE594-A88C-9A8A-BDB2-4575A0833FCB}"/>
+              </a:ext>
+            </a:extLst>
+          </p:cNvPr>
+          <p:cNvPicPr>
+            <a:picLocks noChangeAspect="1"/>
+          </p:cNvPicPr>
+          <p:nvPr/>
+        </p:nvPicPr>
+        <p:blipFill>
+          <a:blip r:embed="rId2"/>
+          <a:stretch>
+            <a:fillRect/>
+          </a:stretch>
+        </p:blipFill>
+        <p:spPr>
+          <a:xfrm>
+            <a:off x="1" y="2107564"/>
+            <a:ext cx="9144000" cy="4750436"/>
+          </a:xfrm>
+          <a:prstGeom prst="rect">
+            <a:avLst/>
+          </a:prstGeom>
+        </p:spPr>
+      </p:pic>
       <p:sp>
         <p:nvSpPr>
           <p:cNvPr id="2" name="标题 1">
             <a:extLst>
               <a:ext uri="{FF2B5EF4-FFF2-40B4-BE49-F238E27FC236}">
-                <a16:creationId xmlns:a16="http://schemas.microsoft.com/office/drawing/2014/main" id="{C7333796-D9C8-D045-C5DC-F27BFABD0C1E}"/>
+                <a16:creationId xmlns:a16="http://schemas.microsoft.com/office/drawing/2014/main" id="{227B89AB-907D-87DC-A1B3-A86F61B3C6FF}"/>
               </a:ext>
             </a:extLst>
           </p:cNvPr>
@@ -14123,52 +14279,106 @@
           <a:lstStyle/>
           <a:p>
             <a:r>
-              <a:rPr lang="zh-CN" altLang="en-US" dirty="0"/>
-              <a:t>功能拆解</a:t>
-            </a:r>
-            <a:r>
-              <a:rPr lang="en-US" altLang="zh-CN" dirty="0"/>
-              <a:t>——Token</a:t>
-            </a:r>
-            <a:r>
-              <a:rPr lang="zh-CN" altLang="en-US" dirty="0"/>
-              <a:t>机制</a:t>
+              <a:rPr kumimoji="1" lang="zh-CN" altLang="en-US" dirty="0"/>
+              <a:t>数据持久化</a:t>
             </a:r>
           </a:p>
         </p:txBody>
       </p:sp>
-      <p:sp>
-        <p:nvSpPr>
-          <p:cNvPr id="3" name="内容占位符 2">
+      <p:pic>
+        <p:nvPicPr>
+          <p:cNvPr id="4" name="图片 3">
             <a:extLst>
               <a:ext uri="{FF2B5EF4-FFF2-40B4-BE49-F238E27FC236}">
-                <a16:creationId xmlns:a16="http://schemas.microsoft.com/office/drawing/2014/main" id="{DB168A2E-736E-FAE6-FCE8-7B49CD53DC94}"/>
+                <a16:creationId xmlns:a16="http://schemas.microsoft.com/office/drawing/2014/main" id="{D6D7E13E-B05D-A748-60EA-CE69A69DFDEE}"/>
               </a:ext>
             </a:extLst>
           </p:cNvPr>
-          <p:cNvSpPr>
-            <a:spLocks noGrp="1"/>
-          </p:cNvSpPr>
-          <p:nvPr>
-            <p:ph idx="1"/>
-          </p:nvPr>
-        </p:nvSpPr>
-        <p:spPr/>
-        <p:txBody>
-          <a:bodyPr/>
-          <a:lstStyle/>
-          <a:p>
-            <a:pPr marL="0" indent="0">
-              <a:buNone/>
-            </a:pPr>
-            <a:endParaRPr lang="zh-CN" altLang="en-US" dirty="0"/>
-          </a:p>
-        </p:txBody>
-      </p:sp>
+          <p:cNvPicPr>
+            <a:picLocks noChangeAspect="1"/>
+          </p:cNvPicPr>
+          <p:nvPr/>
+        </p:nvPicPr>
+        <p:blipFill>
+          <a:blip r:embed="rId3"/>
+          <a:stretch>
+            <a:fillRect/>
+          </a:stretch>
+        </p:blipFill>
+        <p:spPr>
+          <a:xfrm>
+            <a:off x="1394138" y="2107564"/>
+            <a:ext cx="6754634" cy="2828026"/>
+          </a:xfrm>
+          <a:prstGeom prst="rect">
+            <a:avLst/>
+          </a:prstGeom>
+        </p:spPr>
+      </p:pic>
+      <p:pic>
+        <p:nvPicPr>
+          <p:cNvPr id="5" name="图片 4">
+            <a:extLst>
+              <a:ext uri="{FF2B5EF4-FFF2-40B4-BE49-F238E27FC236}">
+                <a16:creationId xmlns:a16="http://schemas.microsoft.com/office/drawing/2014/main" id="{99C59DC9-E353-AFC6-CB6B-28AFDE1B793A}"/>
+              </a:ext>
+            </a:extLst>
+          </p:cNvPr>
+          <p:cNvPicPr>
+            <a:picLocks noChangeAspect="1"/>
+          </p:cNvPicPr>
+          <p:nvPr/>
+        </p:nvPicPr>
+        <p:blipFill>
+          <a:blip r:embed="rId4"/>
+          <a:stretch>
+            <a:fillRect/>
+          </a:stretch>
+        </p:blipFill>
+        <p:spPr>
+          <a:xfrm>
+            <a:off x="-6187" y="4927625"/>
+            <a:ext cx="3985759" cy="1399710"/>
+          </a:xfrm>
+          <a:prstGeom prst="rect">
+            <a:avLst/>
+          </a:prstGeom>
+        </p:spPr>
+      </p:pic>
+      <p:pic>
+        <p:nvPicPr>
+          <p:cNvPr id="6" name="图片 5">
+            <a:extLst>
+              <a:ext uri="{FF2B5EF4-FFF2-40B4-BE49-F238E27FC236}">
+                <a16:creationId xmlns:a16="http://schemas.microsoft.com/office/drawing/2014/main" id="{D92F46A8-5098-BE49-13F6-845B30866C7A}"/>
+              </a:ext>
+            </a:extLst>
+          </p:cNvPr>
+          <p:cNvPicPr>
+            <a:picLocks noChangeAspect="1"/>
+          </p:cNvPicPr>
+          <p:nvPr/>
+        </p:nvPicPr>
+        <p:blipFill>
+          <a:blip r:embed="rId5"/>
+          <a:stretch>
+            <a:fillRect/>
+          </a:stretch>
+        </p:blipFill>
+        <p:spPr>
+          <a:xfrm>
+            <a:off x="3825048" y="4935590"/>
+            <a:ext cx="5318952" cy="1922410"/>
+          </a:xfrm>
+          <a:prstGeom prst="rect">
+            <a:avLst/>
+          </a:prstGeom>
+        </p:spPr>
+      </p:pic>
     </p:spTree>
     <p:extLst>
       <p:ext uri="{BB962C8B-B14F-4D97-AF65-F5344CB8AC3E}">
-        <p14:creationId xmlns:p14="http://schemas.microsoft.com/office/powerpoint/2010/main" val="464473482"/>
+        <p14:creationId xmlns:p14="http://schemas.microsoft.com/office/powerpoint/2010/main" val="2686667128"/>
       </p:ext>
     </p:extLst>
   </p:cSld>
@@ -14218,25 +14428,17 @@
           <a:p>
             <a:r>
               <a:rPr lang="zh-CN" altLang="en-US" dirty="0"/>
-              <a:t>功能拆解</a:t>
-            </a:r>
-            <a:r>
-              <a:rPr lang="en-US" altLang="zh-CN" dirty="0"/>
-              <a:t>——</a:t>
-            </a:r>
-            <a:r>
-              <a:rPr lang="zh-CN" altLang="en-US" dirty="0"/>
-              <a:t>视频的上传与下载</a:t>
+              <a:t>用户会话管理</a:t>
             </a:r>
           </a:p>
         </p:txBody>
       </p:sp>
       <p:sp>
         <p:nvSpPr>
-          <p:cNvPr id="3" name="内容占位符 2">
+          <p:cNvPr id="6" name="内容占位符 2">
             <a:extLst>
               <a:ext uri="{FF2B5EF4-FFF2-40B4-BE49-F238E27FC236}">
-                <a16:creationId xmlns:a16="http://schemas.microsoft.com/office/drawing/2014/main" id="{DB168A2E-736E-FAE6-FCE8-7B49CD53DC94}"/>
+                <a16:creationId xmlns:a16="http://schemas.microsoft.com/office/drawing/2014/main" id="{B0E3F4F3-7CD9-3C5B-2967-4D2BA9B55243}"/>
               </a:ext>
             </a:extLst>
           </p:cNvPr>
@@ -14247,15 +14449,379 @@
             <p:ph idx="1"/>
           </p:nvPr>
         </p:nvSpPr>
+        <p:spPr>
+          <a:xfrm>
+            <a:off x="864382" y="2489199"/>
+            <a:ext cx="7338711" cy="4001753"/>
+          </a:xfrm>
+        </p:spPr>
+        <p:txBody>
+          <a:bodyPr/>
+          <a:lstStyle/>
+          <a:p>
+            <a:r>
+              <a:rPr lang="zh-CN" altLang="en-US" dirty="0"/>
+              <a:t>使用</a:t>
+            </a:r>
+            <a:r>
+              <a:rPr lang="en-US" altLang="zh-CN" dirty="0"/>
+              <a:t>JSON</a:t>
+            </a:r>
+            <a:r>
+              <a:rPr lang="zh-CN" altLang="en-US" dirty="0"/>
+              <a:t> </a:t>
+            </a:r>
+            <a:r>
+              <a:rPr lang="en-US" altLang="zh-CN" dirty="0"/>
+              <a:t>Web</a:t>
+            </a:r>
+            <a:r>
+              <a:rPr lang="zh-CN" altLang="en-US" dirty="0"/>
+              <a:t> </a:t>
+            </a:r>
+            <a:r>
+              <a:rPr lang="en-US" altLang="zh-CN" dirty="0"/>
+              <a:t>Token</a:t>
+            </a:r>
+            <a:r>
+              <a:rPr lang="zh-CN" altLang="en-US" dirty="0"/>
+              <a:t>（</a:t>
+            </a:r>
+            <a:r>
+              <a:rPr lang="en-US" altLang="zh-CN" dirty="0"/>
+              <a:t>JWT</a:t>
+            </a:r>
+            <a:r>
+              <a:rPr lang="zh-CN" altLang="en-US" dirty="0"/>
+              <a:t>）进行会话管理和权限验证</a:t>
+            </a:r>
+            <a:endParaRPr lang="en-US" altLang="zh-CN" dirty="0"/>
+          </a:p>
+          <a:p>
+            <a:r>
+              <a:rPr lang="zh-CN" altLang="en-US" dirty="0"/>
+              <a:t>将持有者用户</a:t>
+            </a:r>
+            <a:r>
+              <a:rPr lang="en-US" altLang="zh-CN" dirty="0"/>
+              <a:t>ID</a:t>
+            </a:r>
+            <a:r>
+              <a:rPr lang="zh-CN" altLang="en-US" dirty="0"/>
+              <a:t>、</a:t>
+            </a:r>
+            <a:r>
+              <a:rPr lang="en-US" altLang="zh-CN" dirty="0"/>
+              <a:t>Token</a:t>
+            </a:r>
+            <a:r>
+              <a:rPr lang="zh-CN" altLang="en-US" dirty="0"/>
+              <a:t>有效期写入</a:t>
+            </a:r>
+            <a:r>
+              <a:rPr lang="en-US" altLang="zh-CN" dirty="0"/>
+              <a:t>Token</a:t>
+            </a:r>
+            <a:r>
+              <a:rPr lang="zh-CN" altLang="en-US" dirty="0"/>
+              <a:t>，对</a:t>
+            </a:r>
+            <a:r>
+              <a:rPr lang="en-US" altLang="zh-CN" dirty="0"/>
+              <a:t>Token</a:t>
+            </a:r>
+            <a:r>
+              <a:rPr lang="zh-CN" altLang="en-US" dirty="0"/>
+              <a:t>进行签名防止被篡改</a:t>
+            </a:r>
+            <a:endParaRPr lang="en-US" altLang="zh-CN" dirty="0"/>
+          </a:p>
+          <a:p>
+            <a:r>
+              <a:rPr lang="zh-CN" altLang="en-US" dirty="0"/>
+              <a:t>服务器无状态，减轻服务器负担</a:t>
+            </a:r>
+            <a:endParaRPr lang="en-US" altLang="zh-CN" dirty="0"/>
+          </a:p>
+          <a:p>
+            <a:endParaRPr lang="en-US" altLang="zh-CN" dirty="0"/>
+          </a:p>
+        </p:txBody>
+      </p:sp>
+      <p:pic>
+        <p:nvPicPr>
+          <p:cNvPr id="7" name="图片 6">
+            <a:extLst>
+              <a:ext uri="{FF2B5EF4-FFF2-40B4-BE49-F238E27FC236}">
+                <a16:creationId xmlns:a16="http://schemas.microsoft.com/office/drawing/2014/main" id="{BB461B1D-9191-C425-DE7B-18E52AA6EA16}"/>
+              </a:ext>
+            </a:extLst>
+          </p:cNvPr>
+          <p:cNvPicPr>
+            <a:picLocks noChangeAspect="1"/>
+          </p:cNvPicPr>
+          <p:nvPr/>
+        </p:nvPicPr>
+        <p:blipFill>
+          <a:blip r:embed="rId2"/>
+          <a:stretch>
+            <a:fillRect/>
+          </a:stretch>
+        </p:blipFill>
+        <p:spPr>
+          <a:xfrm>
+            <a:off x="940907" y="4163122"/>
+            <a:ext cx="6938493" cy="2460332"/>
+          </a:xfrm>
+          <a:prstGeom prst="rect">
+            <a:avLst/>
+          </a:prstGeom>
+        </p:spPr>
+      </p:pic>
+    </p:spTree>
+    <p:extLst>
+      <p:ext uri="{BB962C8B-B14F-4D97-AF65-F5344CB8AC3E}">
+        <p14:creationId xmlns:p14="http://schemas.microsoft.com/office/powerpoint/2010/main" val="464473482"/>
+      </p:ext>
+    </p:extLst>
+  </p:cSld>
+  <p:clrMapOvr>
+    <a:masterClrMapping/>
+  </p:clrMapOvr>
+</p:sld>
+</file>
+
+<file path=ppt/slides/slide16.xml><?xml version="1.0" encoding="utf-8"?>
+<p:sld xmlns:a="http://schemas.openxmlformats.org/drawingml/2006/main" xmlns:r="http://schemas.openxmlformats.org/officeDocument/2006/relationships" xmlns:p="http://schemas.openxmlformats.org/presentationml/2006/main">
+  <p:cSld>
+    <p:spTree>
+      <p:nvGrpSpPr>
+        <p:cNvPr id="1" name=""/>
+        <p:cNvGrpSpPr/>
+        <p:nvPr/>
+      </p:nvGrpSpPr>
+      <p:grpSpPr>
+        <a:xfrm>
+          <a:off x="0" y="0"/>
+          <a:ext cx="0" cy="0"/>
+          <a:chOff x="0" y="0"/>
+          <a:chExt cx="0" cy="0"/>
+        </a:xfrm>
+      </p:grpSpPr>
+      <p:sp>
+        <p:nvSpPr>
+          <p:cNvPr id="2" name="标题 1">
+            <a:extLst>
+              <a:ext uri="{FF2B5EF4-FFF2-40B4-BE49-F238E27FC236}">
+                <a16:creationId xmlns:a16="http://schemas.microsoft.com/office/drawing/2014/main" id="{C7333796-D9C8-D045-C5DC-F27BFABD0C1E}"/>
+              </a:ext>
+            </a:extLst>
+          </p:cNvPr>
+          <p:cNvSpPr>
+            <a:spLocks noGrp="1"/>
+          </p:cNvSpPr>
+          <p:nvPr>
+            <p:ph type="title"/>
+          </p:nvPr>
+        </p:nvSpPr>
         <p:spPr/>
         <p:txBody>
           <a:bodyPr/>
           <a:lstStyle/>
           <a:p>
-            <a:pPr marL="0" indent="0">
-              <a:buNone/>
-            </a:pPr>
-            <a:endParaRPr lang="zh-CN" altLang="en-US" dirty="0"/>
+            <a:r>
+              <a:rPr lang="zh-CN" altLang="en-US" dirty="0"/>
+              <a:t>视频处理与</a:t>
+            </a:r>
+            <a:r>
+              <a:rPr lang="en-US" altLang="zh-CN" dirty="0"/>
+              <a:t>Feed</a:t>
+            </a:r>
+            <a:r>
+              <a:rPr lang="zh-CN" altLang="en-US" dirty="0"/>
+              <a:t>流</a:t>
+            </a:r>
+          </a:p>
+        </p:txBody>
+      </p:sp>
+      <p:sp>
+        <p:nvSpPr>
+          <p:cNvPr id="4" name="内容占位符 2">
+            <a:extLst>
+              <a:ext uri="{FF2B5EF4-FFF2-40B4-BE49-F238E27FC236}">
+                <a16:creationId xmlns:a16="http://schemas.microsoft.com/office/drawing/2014/main" id="{5DBD8416-8A5A-2101-DD4C-4B0E026BC4CD}"/>
+              </a:ext>
+            </a:extLst>
+          </p:cNvPr>
+          <p:cNvSpPr>
+            <a:spLocks noGrp="1"/>
+          </p:cNvSpPr>
+          <p:nvPr>
+            <p:ph idx="1"/>
+          </p:nvPr>
+        </p:nvSpPr>
+        <p:spPr>
+          <a:xfrm>
+            <a:off x="864382" y="2489199"/>
+            <a:ext cx="7338711" cy="4001753"/>
+          </a:xfrm>
+        </p:spPr>
+        <p:txBody>
+          <a:bodyPr/>
+          <a:lstStyle/>
+          <a:p>
+            <a:r>
+              <a:rPr lang="zh-CN" altLang="en-US" dirty="0"/>
+              <a:t>视频处理</a:t>
+            </a:r>
+            <a:endParaRPr lang="en-US" altLang="zh-CN" dirty="0"/>
+          </a:p>
+          <a:p>
+            <a:pPr lvl="1"/>
+            <a:r>
+              <a:rPr lang="zh-CN" altLang="en-US" dirty="0"/>
+              <a:t>请求方发送视频</a:t>
+            </a:r>
+            <a:r>
+              <a:rPr lang="en-US" altLang="zh-CN" dirty="0"/>
+              <a:t>-&gt;</a:t>
+            </a:r>
+            <a:r>
+              <a:rPr lang="zh-CN" altLang="en-US" dirty="0"/>
+              <a:t>保存视频文件到本地</a:t>
+            </a:r>
+            <a:r>
+              <a:rPr lang="en-US" altLang="zh-CN" dirty="0"/>
+              <a:t>-&gt;</a:t>
+            </a:r>
+            <a:r>
+              <a:rPr lang="zh-CN" altLang="en-US" dirty="0"/>
+              <a:t>使用</a:t>
+            </a:r>
+            <a:r>
+              <a:rPr lang="en-US" altLang="zh-CN" dirty="0" err="1"/>
+              <a:t>ffmpeg</a:t>
+            </a:r>
+            <a:r>
+              <a:rPr lang="zh-CN" altLang="en-US" dirty="0"/>
+              <a:t>截取视频封面</a:t>
+            </a:r>
+            <a:r>
+              <a:rPr lang="en-US" altLang="zh-CN" dirty="0"/>
+              <a:t>-&gt;</a:t>
+            </a:r>
+            <a:r>
+              <a:rPr lang="zh-CN" altLang="en-US" dirty="0"/>
+              <a:t>整理信息并保存到数据库</a:t>
+            </a:r>
+            <a:endParaRPr lang="en-US" altLang="zh-CN" dirty="0"/>
+          </a:p>
+          <a:p>
+            <a:r>
+              <a:rPr lang="en-US" altLang="zh-CN" dirty="0"/>
+              <a:t>Feed</a:t>
+            </a:r>
+            <a:r>
+              <a:rPr lang="zh-CN" altLang="en-US" dirty="0"/>
+              <a:t>流</a:t>
+            </a:r>
+            <a:endParaRPr lang="en-US" altLang="zh-CN" dirty="0"/>
+          </a:p>
+          <a:p>
+            <a:pPr lvl="1"/>
+            <a:r>
+              <a:rPr lang="zh-CN" altLang="en-US" dirty="0"/>
+              <a:t>请求方参数：</a:t>
+            </a:r>
+            <a:r>
+              <a:rPr lang="en-US" altLang="zh-CN" dirty="0"/>
+              <a:t>token</a:t>
+            </a:r>
+            <a:r>
+              <a:rPr lang="zh-CN" altLang="en-US" dirty="0"/>
+              <a:t>（可选），</a:t>
+            </a:r>
+            <a:r>
+              <a:rPr lang="en-US" altLang="zh-CN" dirty="0" err="1"/>
+              <a:t>lastest_time</a:t>
+            </a:r>
+            <a:r>
+              <a:rPr lang="zh-CN" altLang="en-US" dirty="0"/>
+              <a:t>（可选，若不存在则视为当前时间）</a:t>
+            </a:r>
+            <a:endParaRPr lang="en-US" altLang="zh-CN" dirty="0"/>
+          </a:p>
+          <a:p>
+            <a:pPr lvl="1"/>
+            <a:r>
+              <a:rPr lang="zh-CN" altLang="en-US" dirty="0"/>
+              <a:t>发回：下次请求的</a:t>
+            </a:r>
+            <a:r>
+              <a:rPr lang="en-US" altLang="zh-CN" dirty="0" err="1"/>
+              <a:t>lastest_time</a:t>
+            </a:r>
+            <a:r>
+              <a:rPr lang="zh-CN" altLang="en-US" dirty="0"/>
+              <a:t>参数、不超过</a:t>
+            </a:r>
+            <a:r>
+              <a:rPr lang="en-US" altLang="zh-CN" dirty="0"/>
+              <a:t>10</a:t>
+            </a:r>
+            <a:r>
+              <a:rPr lang="zh-CN" altLang="en-US" dirty="0"/>
+              <a:t>个发布时间早于</a:t>
+            </a:r>
+            <a:r>
+              <a:rPr lang="en-US" altLang="zh-CN" dirty="0" err="1"/>
+              <a:t>lastest_time</a:t>
+            </a:r>
+            <a:r>
+              <a:rPr lang="zh-CN" altLang="en-US" dirty="0"/>
+              <a:t>的视频信息（视频</a:t>
+            </a:r>
+            <a:r>
+              <a:rPr lang="en-US" altLang="zh-CN" dirty="0"/>
+              <a:t>ID</a:t>
+            </a:r>
+            <a:r>
+              <a:rPr lang="zh-CN" altLang="en-US" dirty="0"/>
+              <a:t>、视频</a:t>
+            </a:r>
+            <a:r>
+              <a:rPr lang="en-US" altLang="zh-CN" dirty="0"/>
+              <a:t>URL</a:t>
+            </a:r>
+            <a:r>
+              <a:rPr lang="zh-CN" altLang="en-US" dirty="0"/>
+              <a:t>、视频封面</a:t>
+            </a:r>
+            <a:r>
+              <a:rPr lang="en-US" altLang="zh-CN" dirty="0"/>
+              <a:t>URL</a:t>
+            </a:r>
+            <a:r>
+              <a:rPr lang="zh-CN" altLang="en-US" dirty="0"/>
+              <a:t>等）</a:t>
+            </a:r>
+            <a:endParaRPr lang="en-US" altLang="zh-CN" dirty="0"/>
+          </a:p>
+          <a:p>
+            <a:pPr lvl="1"/>
+            <a:r>
+              <a:rPr lang="zh-CN" altLang="en-US" dirty="0"/>
+              <a:t>用户登录情况下根据用户</a:t>
+            </a:r>
+            <a:r>
+              <a:rPr lang="en-US" altLang="zh-CN" dirty="0"/>
+              <a:t>token</a:t>
+            </a:r>
+            <a:r>
+              <a:rPr lang="zh-CN" altLang="en-US" dirty="0"/>
+              <a:t>进行个性化推荐（待实现）</a:t>
+            </a:r>
+            <a:endParaRPr lang="en-US" altLang="zh-CN" dirty="0"/>
           </a:p>
         </p:txBody>
       </p:sp>
@@ -14263,6 +14829,70 @@
     <p:extLst>
       <p:ext uri="{BB962C8B-B14F-4D97-AF65-F5344CB8AC3E}">
         <p14:creationId xmlns:p14="http://schemas.microsoft.com/office/powerpoint/2010/main" val="762606233"/>
+      </p:ext>
+    </p:extLst>
+  </p:cSld>
+  <p:clrMapOvr>
+    <a:masterClrMapping/>
+  </p:clrMapOvr>
+</p:sld>
+</file>
+
+<file path=ppt/slides/slide17.xml><?xml version="1.0" encoding="utf-8"?>
+<p:sld xmlns:a="http://schemas.openxmlformats.org/drawingml/2006/main" xmlns:r="http://schemas.openxmlformats.org/officeDocument/2006/relationships" xmlns:p="http://schemas.openxmlformats.org/presentationml/2006/main">
+  <p:cSld>
+    <p:spTree>
+      <p:nvGrpSpPr>
+        <p:cNvPr id="1" name=""/>
+        <p:cNvGrpSpPr/>
+        <p:nvPr/>
+      </p:nvGrpSpPr>
+      <p:grpSpPr>
+        <a:xfrm>
+          <a:off x="0" y="0"/>
+          <a:ext cx="0" cy="0"/>
+          <a:chOff x="0" y="0"/>
+          <a:chExt cx="0" cy="0"/>
+        </a:xfrm>
+      </p:grpSpPr>
+      <p:sp>
+        <p:nvSpPr>
+          <p:cNvPr id="2" name="标题 1">
+            <a:extLst>
+              <a:ext uri="{FF2B5EF4-FFF2-40B4-BE49-F238E27FC236}">
+                <a16:creationId xmlns:a16="http://schemas.microsoft.com/office/drawing/2014/main" id="{56E17631-2A97-DA1A-C4E1-25FA5D98DC7B}"/>
+              </a:ext>
+            </a:extLst>
+          </p:cNvPr>
+          <p:cNvSpPr>
+            <a:spLocks noGrp="1"/>
+          </p:cNvSpPr>
+          <p:nvPr>
+            <p:ph type="ctrTitle"/>
+          </p:nvPr>
+        </p:nvSpPr>
+        <p:spPr>
+          <a:xfrm>
+            <a:off x="0" y="2949262"/>
+            <a:ext cx="9144000" cy="959475"/>
+          </a:xfrm>
+        </p:spPr>
+        <p:txBody>
+          <a:bodyPr/>
+          <a:lstStyle/>
+          <a:p>
+            <a:pPr algn="ctr"/>
+            <a:r>
+              <a:rPr lang="zh-CN" altLang="en-US" dirty="0"/>
+              <a:t>感谢聆听</a:t>
+            </a:r>
+          </a:p>
+        </p:txBody>
+      </p:sp>
+    </p:spTree>
+    <p:extLst>
+      <p:ext uri="{BB962C8B-B14F-4D97-AF65-F5344CB8AC3E}">
+        <p14:creationId xmlns:p14="http://schemas.microsoft.com/office/powerpoint/2010/main" val="30117552"/>
       </p:ext>
     </p:extLst>
   </p:cSld>

</xml_diff>

<commit_message>
FEAT: add some slides
</commit_message>
<xml_diff>
--- a/项目介绍.pptx
+++ b/项目介绍.pptx
@@ -15,13 +15,14 @@
     <p:sldId id="267" r:id="rId9"/>
     <p:sldId id="268" r:id="rId10"/>
     <p:sldId id="261" r:id="rId11"/>
-    <p:sldId id="260" r:id="rId12"/>
-    <p:sldId id="269" r:id="rId13"/>
-    <p:sldId id="270" r:id="rId14"/>
-    <p:sldId id="273" r:id="rId15"/>
-    <p:sldId id="271" r:id="rId16"/>
-    <p:sldId id="272" r:id="rId17"/>
-    <p:sldId id="274" r:id="rId18"/>
+    <p:sldId id="275" r:id="rId12"/>
+    <p:sldId id="260" r:id="rId13"/>
+    <p:sldId id="269" r:id="rId14"/>
+    <p:sldId id="270" r:id="rId15"/>
+    <p:sldId id="273" r:id="rId16"/>
+    <p:sldId id="271" r:id="rId17"/>
+    <p:sldId id="272" r:id="rId18"/>
+    <p:sldId id="274" r:id="rId19"/>
   </p:sldIdLst>
   <p:sldSz cx="9144000" cy="6858000" type="screen4x3"/>
   <p:notesSz cx="6858000" cy="9144000"/>
@@ -13640,7 +13641,9 @@
         </p:nvSpPr>
         <p:spPr/>
         <p:txBody>
-          <a:bodyPr/>
+          <a:bodyPr>
+            <a:normAutofit lnSpcReduction="10000"/>
+          </a:bodyPr>
           <a:lstStyle/>
           <a:p>
             <a:r>
@@ -13650,6 +13653,9 @@
             <a:endParaRPr lang="en-US" altLang="zh-CN" dirty="0"/>
           </a:p>
           <a:p>
+            <a:endParaRPr lang="en-US" altLang="zh-CN" dirty="0"/>
+          </a:p>
+          <a:p>
             <a:r>
               <a:rPr lang="zh-CN" altLang="en-US" dirty="0"/>
               <a:t>不受限制的视频分享</a:t>
@@ -13657,6 +13663,9 @@
             <a:endParaRPr lang="en-US" altLang="zh-CN" dirty="0"/>
           </a:p>
           <a:p>
+            <a:endParaRPr lang="en-US" altLang="zh-CN" dirty="0"/>
+          </a:p>
+          <a:p>
             <a:r>
               <a:rPr lang="zh-CN" altLang="en-US" dirty="0"/>
               <a:t>表达你对视频创作者的认可</a:t>
@@ -13664,10 +13673,16 @@
             <a:endParaRPr lang="en-US" altLang="zh-CN" dirty="0"/>
           </a:p>
           <a:p>
+            <a:endParaRPr lang="en-US" altLang="zh-CN" dirty="0"/>
+          </a:p>
+          <a:p>
             <a:r>
               <a:rPr lang="zh-CN" altLang="en-US" dirty="0"/>
               <a:t>随时随地发表自己的高论</a:t>
             </a:r>
+            <a:endParaRPr lang="en-US" altLang="zh-CN" dirty="0"/>
+          </a:p>
+          <a:p>
             <a:endParaRPr lang="en-US" altLang="zh-CN" dirty="0"/>
           </a:p>
           <a:p>
@@ -13767,6 +13782,190 @@
           <p:cNvPr id="2" name="标题 1">
             <a:extLst>
               <a:ext uri="{FF2B5EF4-FFF2-40B4-BE49-F238E27FC236}">
+                <a16:creationId xmlns:a16="http://schemas.microsoft.com/office/drawing/2014/main" id="{A457C9D1-3EF6-AAE7-0AD9-98D9F1913EEB}"/>
+              </a:ext>
+            </a:extLst>
+          </p:cNvPr>
+          <p:cNvSpPr>
+            <a:spLocks noGrp="1"/>
+          </p:cNvSpPr>
+          <p:nvPr>
+            <p:ph type="title"/>
+          </p:nvPr>
+        </p:nvSpPr>
+        <p:spPr/>
+        <p:txBody>
+          <a:bodyPr/>
+          <a:lstStyle/>
+          <a:p>
+            <a:r>
+              <a:rPr kumimoji="1" lang="zh-CN" altLang="en-US" dirty="0"/>
+              <a:t>项目进展</a:t>
+            </a:r>
+          </a:p>
+        </p:txBody>
+      </p:sp>
+      <p:sp>
+        <p:nvSpPr>
+          <p:cNvPr id="3" name="内容占位符 2">
+            <a:extLst>
+              <a:ext uri="{FF2B5EF4-FFF2-40B4-BE49-F238E27FC236}">
+                <a16:creationId xmlns:a16="http://schemas.microsoft.com/office/drawing/2014/main" id="{39ED35F9-E0C1-0544-8B82-EF2B068C1DA0}"/>
+              </a:ext>
+            </a:extLst>
+          </p:cNvPr>
+          <p:cNvSpPr>
+            <a:spLocks noGrp="1"/>
+          </p:cNvSpPr>
+          <p:nvPr>
+            <p:ph idx="1"/>
+          </p:nvPr>
+        </p:nvSpPr>
+        <p:spPr>
+          <a:xfrm>
+            <a:off x="864381" y="2942824"/>
+            <a:ext cx="5059901" cy="3076976"/>
+          </a:xfrm>
+        </p:spPr>
+        <p:txBody>
+          <a:bodyPr/>
+          <a:lstStyle/>
+          <a:p>
+            <a:r>
+              <a:rPr kumimoji="1" lang="zh-CN" altLang="en-US"/>
+              <a:t>服务端开发</a:t>
+            </a:r>
+            <a:r>
+              <a:rPr kumimoji="1" lang="zh-CN" altLang="en-US" dirty="0"/>
+              <a:t>基本完成</a:t>
+            </a:r>
+            <a:endParaRPr kumimoji="1" lang="en-US" altLang="zh-CN" dirty="0"/>
+          </a:p>
+          <a:p>
+            <a:pPr marL="0" indent="0">
+              <a:buNone/>
+            </a:pPr>
+            <a:endParaRPr kumimoji="1" lang="en-US" altLang="zh-CN" dirty="0"/>
+          </a:p>
+          <a:p>
+            <a:r>
+              <a:rPr kumimoji="1" lang="zh-CN" altLang="en-US" dirty="0"/>
+              <a:t>实现了用户登录</a:t>
+            </a:r>
+            <a:r>
+              <a:rPr kumimoji="1" lang="en-US" altLang="zh-CN" dirty="0"/>
+              <a:t>/</a:t>
+            </a:r>
+            <a:r>
+              <a:rPr kumimoji="1" lang="zh-CN" altLang="en-US" dirty="0"/>
+              <a:t>注册、视频流推送、视频投稿</a:t>
+            </a:r>
+            <a:r>
+              <a:rPr kumimoji="1" lang="en-US" altLang="zh-CN" dirty="0"/>
+              <a:t>/</a:t>
+            </a:r>
+            <a:r>
+              <a:rPr kumimoji="1" lang="zh-CN" altLang="en-US" dirty="0"/>
+              <a:t>点赞</a:t>
+            </a:r>
+            <a:r>
+              <a:rPr kumimoji="1" lang="en-US" altLang="zh-CN" dirty="0"/>
+              <a:t>/</a:t>
+            </a:r>
+            <a:r>
+              <a:rPr kumimoji="1" lang="zh-CN" altLang="en-US" dirty="0"/>
+              <a:t>评论等</a:t>
+            </a:r>
+            <a:r>
+              <a:rPr kumimoji="1" lang="en-US" altLang="zh-CN" dirty="0"/>
+              <a:t>API</a:t>
+            </a:r>
+            <a:endParaRPr kumimoji="1" lang="zh-CN" altLang="en-US" dirty="0"/>
+          </a:p>
+        </p:txBody>
+      </p:sp>
+      <p:pic>
+        <p:nvPicPr>
+          <p:cNvPr id="1026" name="Picture 2" descr="进度条圆形进度条色轮- 免费矢量图形Pixabay">
+            <a:extLst>
+              <a:ext uri="{FF2B5EF4-FFF2-40B4-BE49-F238E27FC236}">
+                <a16:creationId xmlns:a16="http://schemas.microsoft.com/office/drawing/2014/main" id="{17B5FA63-804F-9291-B873-ED3B3693F172}"/>
+              </a:ext>
+            </a:extLst>
+          </p:cNvPr>
+          <p:cNvPicPr>
+            <a:picLocks noChangeAspect="1" noChangeArrowheads="1"/>
+          </p:cNvPicPr>
+          <p:nvPr/>
+        </p:nvPicPr>
+        <p:blipFill>
+          <a:blip r:embed="rId2">
+            <a:extLst>
+              <a:ext uri="{28A0092B-C50C-407E-A947-70E740481C1C}">
+                <a14:useLocalDpi xmlns:a14="http://schemas.microsoft.com/office/drawing/2010/main" val="0"/>
+              </a:ext>
+            </a:extLst>
+          </a:blip>
+          <a:srcRect/>
+          <a:stretch>
+            <a:fillRect/>
+          </a:stretch>
+        </p:blipFill>
+        <p:spPr bwMode="auto">
+          <a:xfrm>
+            <a:off x="6167368" y="3915176"/>
+            <a:ext cx="2371323" cy="2371323"/>
+          </a:xfrm>
+          <a:prstGeom prst="rect">
+            <a:avLst/>
+          </a:prstGeom>
+          <a:noFill/>
+          <a:extLst>
+            <a:ext uri="{909E8E84-426E-40DD-AFC4-6F175D3DCCD1}">
+              <a14:hiddenFill xmlns:a14="http://schemas.microsoft.com/office/drawing/2010/main">
+                <a:solidFill>
+                  <a:srgbClr val="FFFFFF"/>
+                </a:solidFill>
+              </a14:hiddenFill>
+            </a:ext>
+          </a:extLst>
+        </p:spPr>
+      </p:pic>
+    </p:spTree>
+    <p:extLst>
+      <p:ext uri="{BB962C8B-B14F-4D97-AF65-F5344CB8AC3E}">
+        <p14:creationId xmlns:p14="http://schemas.microsoft.com/office/powerpoint/2010/main" val="1453794787"/>
+      </p:ext>
+    </p:extLst>
+  </p:cSld>
+  <p:clrMapOvr>
+    <a:masterClrMapping/>
+  </p:clrMapOvr>
+</p:sld>
+</file>
+
+<file path=ppt/slides/slide12.xml><?xml version="1.0" encoding="utf-8"?>
+<p:sld xmlns:a="http://schemas.openxmlformats.org/drawingml/2006/main" xmlns:r="http://schemas.openxmlformats.org/officeDocument/2006/relationships" xmlns:p="http://schemas.openxmlformats.org/presentationml/2006/main">
+  <p:cSld>
+    <p:spTree>
+      <p:nvGrpSpPr>
+        <p:cNvPr id="1" name=""/>
+        <p:cNvGrpSpPr/>
+        <p:nvPr/>
+      </p:nvGrpSpPr>
+      <p:grpSpPr>
+        <a:xfrm>
+          <a:off x="0" y="0"/>
+          <a:ext cx="0" cy="0"/>
+          <a:chOff x="0" y="0"/>
+          <a:chExt cx="0" cy="0"/>
+        </a:xfrm>
+      </p:grpSpPr>
+      <p:sp>
+        <p:nvSpPr>
+          <p:cNvPr id="2" name="标题 1">
+            <a:extLst>
+              <a:ext uri="{FF2B5EF4-FFF2-40B4-BE49-F238E27FC236}">
                 <a16:creationId xmlns:a16="http://schemas.microsoft.com/office/drawing/2014/main" id="{C7333796-D9C8-D045-C5DC-F27BFABD0C1E}"/>
               </a:ext>
             </a:extLst>
@@ -13847,6 +14046,12 @@
               <a:rPr lang="zh-CN" altLang="en-US" dirty="0"/>
               <a:t>开发的一种静态类型、编译型的编程语言。是一种简单、高效、可靠的编程语言，非常适合开发网络服务和分布式系统</a:t>
             </a:r>
+            <a:endParaRPr lang="en-US" altLang="zh-CN" dirty="0"/>
+          </a:p>
+          <a:p>
+            <a:pPr marL="402336" lvl="1" indent="0">
+              <a:buNone/>
+            </a:pPr>
             <a:endParaRPr lang="en-US" altLang="zh-CN" dirty="0"/>
           </a:p>
           <a:p>
@@ -13938,7 +14143,7 @@
 </p:sld>
 </file>
 
-<file path=ppt/slides/slide12.xml><?xml version="1.0" encoding="utf-8"?>
+<file path=ppt/slides/slide13.xml><?xml version="1.0" encoding="utf-8"?>
 <p:sld xmlns:a="http://schemas.openxmlformats.org/drawingml/2006/main" xmlns:r="http://schemas.openxmlformats.org/officeDocument/2006/relationships" xmlns:p="http://schemas.openxmlformats.org/presentationml/2006/main">
   <p:cSld>
     <p:spTree>
@@ -14043,7 +14248,7 @@
 </p:sld>
 </file>
 
-<file path=ppt/slides/slide13.xml><?xml version="1.0" encoding="utf-8"?>
+<file path=ppt/slides/slide14.xml><?xml version="1.0" encoding="utf-8"?>
 <p:sld xmlns:a="http://schemas.openxmlformats.org/drawingml/2006/main" xmlns:r="http://schemas.openxmlformats.org/officeDocument/2006/relationships" xmlns:p="http://schemas.openxmlformats.org/presentationml/2006/main">
   <p:cSld>
     <p:spTree>
@@ -14210,7 +14415,7 @@
 </p:sld>
 </file>
 
-<file path=ppt/slides/slide14.xml><?xml version="1.0" encoding="utf-8"?>
+<file path=ppt/slides/slide15.xml><?xml version="1.0" encoding="utf-8"?>
 <p:sld xmlns:a="http://schemas.openxmlformats.org/drawingml/2006/main" xmlns:r="http://schemas.openxmlformats.org/officeDocument/2006/relationships" xmlns:p="http://schemas.openxmlformats.org/presentationml/2006/main">
   <p:cSld>
     <p:spTree>
@@ -14249,8 +14454,8 @@
         </p:blipFill>
         <p:spPr>
           <a:xfrm>
-            <a:off x="1" y="2107564"/>
-            <a:ext cx="9144000" cy="4750436"/>
+            <a:off x="1" y="2202286"/>
+            <a:ext cx="9144000" cy="4655714"/>
           </a:xfrm>
           <a:prstGeom prst="rect">
             <a:avLst/>
@@ -14307,8 +14512,8 @@
         </p:blipFill>
         <p:spPr>
           <a:xfrm>
-            <a:off x="1394138" y="2107564"/>
-            <a:ext cx="6754634" cy="2828026"/>
+            <a:off x="1394138" y="2202286"/>
+            <a:ext cx="6754634" cy="2733303"/>
           </a:xfrm>
           <a:prstGeom prst="rect">
             <a:avLst/>
@@ -14388,7 +14593,7 @@
 </p:sld>
 </file>
 
-<file path=ppt/slides/slide15.xml><?xml version="1.0" encoding="utf-8"?>
+<file path=ppt/slides/slide16.xml><?xml version="1.0" encoding="utf-8"?>
 <p:sld xmlns:a="http://schemas.openxmlformats.org/drawingml/2006/main" xmlns:r="http://schemas.openxmlformats.org/officeDocument/2006/relationships" xmlns:p="http://schemas.openxmlformats.org/presentationml/2006/main">
   <p:cSld>
     <p:spTree>
@@ -14539,7 +14744,7 @@
           <a:p>
             <a:r>
               <a:rPr lang="zh-CN" altLang="en-US" dirty="0"/>
-              <a:t>服务器无状态，减轻服务器负担</a:t>
+              <a:t>无状态的服务器</a:t>
             </a:r>
             <a:endParaRPr lang="en-US" altLang="zh-CN" dirty="0"/>
           </a:p>
@@ -14591,7 +14796,7 @@
 </p:sld>
 </file>
 
-<file path=ppt/slides/slide16.xml><?xml version="1.0" encoding="utf-8"?>
+<file path=ppt/slides/slide17.xml><?xml version="1.0" encoding="utf-8"?>
 <p:sld xmlns:a="http://schemas.openxmlformats.org/drawingml/2006/main" xmlns:r="http://schemas.openxmlformats.org/officeDocument/2006/relationships" xmlns:p="http://schemas.openxmlformats.org/presentationml/2006/main">
   <p:cSld>
     <p:spTree>
@@ -14717,6 +14922,12 @@
             <a:endParaRPr lang="en-US" altLang="zh-CN" dirty="0"/>
           </a:p>
           <a:p>
+            <a:pPr marL="402336" lvl="1" indent="0">
+              <a:buNone/>
+            </a:pPr>
+            <a:endParaRPr lang="en-US" altLang="zh-CN" dirty="0"/>
+          </a:p>
+          <a:p>
             <a:r>
               <a:rPr lang="en-US" altLang="zh-CN" dirty="0"/>
               <a:t>Feed</a:t>
@@ -14838,7 +15049,7 @@
 </p:sld>
 </file>
 
-<file path=ppt/slides/slide17.xml><?xml version="1.0" encoding="utf-8"?>
+<file path=ppt/slides/slide18.xml><?xml version="1.0" encoding="utf-8"?>
 <p:sld xmlns:a="http://schemas.openxmlformats.org/drawingml/2006/main" xmlns:r="http://schemas.openxmlformats.org/officeDocument/2006/relationships" xmlns:p="http://schemas.openxmlformats.org/presentationml/2006/main">
   <p:cSld>
     <p:spTree>
@@ -14977,24 +15188,15 @@
           <a:lstStyle/>
           <a:p>
             <a:r>
-              <a:rPr lang="en-US" altLang="zh-CN" dirty="0"/>
-              <a:t>NJU TUBE</a:t>
-            </a:r>
-            <a:r>
               <a:rPr lang="zh-CN" altLang="en-US" dirty="0"/>
-              <a:t>是一个面向南京大学全体师生的视频分享平台</a:t>
+              <a:t>一个面向南京大学全体师生的视频分享平台</a:t>
             </a:r>
             <a:endParaRPr lang="en-US" altLang="zh-CN" dirty="0"/>
           </a:p>
           <a:p>
-            <a:r>
-              <a:rPr lang="en-US" altLang="zh-CN" dirty="0"/>
-              <a:t>NJU TUBE</a:t>
-            </a:r>
-            <a:r>
-              <a:rPr lang="zh-CN" altLang="en-US" dirty="0"/>
-              <a:t>是</a:t>
-            </a:r>
+            <a:endParaRPr lang="en-US" altLang="zh-CN" dirty="0"/>
+          </a:p>
+          <a:p>
             <a:r>
               <a:rPr lang="en-US" altLang="zh-CN" dirty="0"/>
               <a:t>2023</a:t>
@@ -15005,7 +15207,7 @@
             </a:r>
             <a:r>
               <a:rPr lang="en-US" altLang="zh-CN" dirty="0"/>
-              <a:t>web</a:t>
+              <a:t>Web</a:t>
             </a:r>
             <a:r>
               <a:rPr lang="zh-CN" altLang="en-US" dirty="0"/>
@@ -15014,17 +15216,16 @@
             <a:endParaRPr lang="en-US" altLang="zh-CN" dirty="0"/>
           </a:p>
           <a:p>
+            <a:endParaRPr lang="en-US" altLang="zh-CN" dirty="0"/>
+          </a:p>
+          <a:p>
+            <a:r>
+              <a:rPr lang="zh-CN" altLang="en-US" dirty="0"/>
+              <a:t>一套拥有服务端与客户端的完整</a:t>
+            </a:r>
             <a:r>
               <a:rPr lang="en-US" altLang="zh-CN" dirty="0"/>
-              <a:t>NJU TUBE</a:t>
-            </a:r>
-            <a:r>
-              <a:rPr lang="zh-CN" altLang="en-US" dirty="0"/>
-              <a:t>是一套拥有服务端与客户端的完整</a:t>
-            </a:r>
-            <a:r>
-              <a:rPr lang="en-US" altLang="zh-CN" dirty="0"/>
-              <a:t>web</a:t>
+              <a:t>Web</a:t>
             </a:r>
             <a:r>
               <a:rPr lang="zh-CN" altLang="en-US" dirty="0"/>
@@ -15114,7 +15315,7 @@
           <a:p>
             <a:r>
               <a:rPr lang="zh-CN" altLang="en-US" dirty="0"/>
-              <a:t>全体南京大学师生</a:t>
+              <a:t>南京大学全体师生</a:t>
             </a:r>
             <a:endParaRPr lang="en-US" altLang="zh-CN" dirty="0"/>
           </a:p>
@@ -15196,7 +15397,9 @@
         </p:nvSpPr>
         <p:spPr/>
         <p:txBody>
-          <a:bodyPr/>
+          <a:bodyPr>
+            <a:normAutofit lnSpcReduction="10000"/>
+          </a:bodyPr>
           <a:lstStyle/>
           <a:p>
             <a:r>
@@ -15209,6 +15412,9 @@
             </a:r>
           </a:p>
           <a:p>
+            <a:endParaRPr lang="en-US" altLang="zh-CN" dirty="0"/>
+          </a:p>
+          <a:p>
             <a:r>
               <a:rPr lang="zh-CN" altLang="en-US" dirty="0"/>
               <a:t>共享</a:t>
@@ -15219,6 +15425,9 @@
             </a:r>
           </a:p>
           <a:p>
+            <a:endParaRPr lang="en-US" altLang="zh-CN" dirty="0"/>
+          </a:p>
+          <a:p>
             <a:r>
               <a:rPr lang="zh-CN" altLang="en-US" dirty="0"/>
               <a:t>匿名</a:t>
@@ -15229,6 +15438,9 @@
             </a:r>
           </a:p>
           <a:p>
+            <a:endParaRPr lang="en-US" altLang="zh-CN" dirty="0"/>
+          </a:p>
+          <a:p>
             <a:r>
               <a:rPr lang="zh-CN" altLang="en-US" dirty="0"/>
               <a:t>无广告</a:t>
@@ -15237,6 +15449,9 @@
               <a:rPr lang="en-US" altLang="zh-CN" dirty="0"/>
               <a:t>(AD-Free)</a:t>
             </a:r>
+          </a:p>
+          <a:p>
+            <a:endParaRPr lang="en-US" altLang="zh-CN" dirty="0"/>
           </a:p>
           <a:p>
             <a:r>
@@ -15397,6 +15612,9 @@
             <a:endParaRPr lang="en-US" altLang="zh-CN" dirty="0"/>
           </a:p>
           <a:p>
+            <a:endParaRPr lang="en-US" altLang="zh-CN" dirty="0"/>
+          </a:p>
+          <a:p>
             <a:r>
               <a:rPr lang="en-US" altLang="zh-CN" dirty="0"/>
               <a:t>NJU TUBE</a:t>
@@ -15405,6 +15623,9 @@
               <a:rPr lang="zh-CN" altLang="en-US" dirty="0"/>
               <a:t>服务器位于南大，服务全体南大师生</a:t>
             </a:r>
+            <a:endParaRPr lang="en-US" altLang="zh-CN" dirty="0"/>
+          </a:p>
+          <a:p>
             <a:endParaRPr lang="en-US" altLang="zh-CN" dirty="0"/>
           </a:p>
           <a:p>
@@ -15561,6 +15782,9 @@
             <a:endParaRPr lang="en-US" altLang="zh-CN" dirty="0"/>
           </a:p>
           <a:p>
+            <a:endParaRPr lang="en-US" altLang="zh-CN" dirty="0"/>
+          </a:p>
+          <a:p>
             <a:r>
               <a:rPr lang="zh-CN" altLang="en-US" dirty="0"/>
               <a:t>每个用户都能够观看并评论所有用户上传的视频</a:t>
@@ -15710,6 +15934,9 @@
             <a:endParaRPr lang="en-US" altLang="zh-CN" dirty="0"/>
           </a:p>
           <a:p>
+            <a:endParaRPr lang="en-US" altLang="zh-CN" dirty="0"/>
+          </a:p>
+          <a:p>
             <a:r>
               <a:rPr lang="zh-CN" altLang="en-US" dirty="0"/>
               <a:t>不收集额外的信息，不使用</a:t>
@@ -15867,6 +16094,9 @@
             <a:endParaRPr lang="en-US" altLang="zh-CN" dirty="0"/>
           </a:p>
           <a:p>
+            <a:endParaRPr lang="en-US" altLang="zh-CN" dirty="0"/>
+          </a:p>
+          <a:p>
             <a:r>
               <a:rPr lang="en-US" altLang="zh-CN" dirty="0"/>
               <a:t>NJU TUBE</a:t>
@@ -16026,6 +16256,9 @@
               <a:rPr lang="zh-CN" altLang="en-US" dirty="0"/>
               <a:t>精神，以极简主义的方式构建</a:t>
             </a:r>
+            <a:endParaRPr lang="en-US" altLang="zh-CN" dirty="0"/>
+          </a:p>
+          <a:p>
             <a:endParaRPr lang="en-US" altLang="zh-CN" dirty="0"/>
           </a:p>
           <a:p>

</xml_diff>